<commit_message>
new benchmarks + uml API + all experiments done
</commit_message>
<xml_diff>
--- a/documents/Managed System/Deployment Diagram 2.0.pptx
+++ b/documents/Managed System/Deployment Diagram 2.0.pptx
@@ -261,7 +261,7 @@
           <a:p>
             <a:fld id="{0C022E22-8E55-0642-8631-076F0F4D5404}" type="datetimeFigureOut">
               <a:rPr lang="it-IT" smtClean="0"/>
-              <a:t>12/11/22</a:t>
+              <a:t>17/11/22</a:t>
             </a:fld>
             <a:endParaRPr lang="it-IT"/>
           </a:p>
@@ -459,7 +459,7 @@
           <a:p>
             <a:fld id="{0C022E22-8E55-0642-8631-076F0F4D5404}" type="datetimeFigureOut">
               <a:rPr lang="it-IT" smtClean="0"/>
-              <a:t>12/11/22</a:t>
+              <a:t>17/11/22</a:t>
             </a:fld>
             <a:endParaRPr lang="it-IT"/>
           </a:p>
@@ -667,7 +667,7 @@
           <a:p>
             <a:fld id="{0C022E22-8E55-0642-8631-076F0F4D5404}" type="datetimeFigureOut">
               <a:rPr lang="it-IT" smtClean="0"/>
-              <a:t>12/11/22</a:t>
+              <a:t>17/11/22</a:t>
             </a:fld>
             <a:endParaRPr lang="it-IT"/>
           </a:p>
@@ -865,7 +865,7 @@
           <a:p>
             <a:fld id="{0C022E22-8E55-0642-8631-076F0F4D5404}" type="datetimeFigureOut">
               <a:rPr lang="it-IT" smtClean="0"/>
-              <a:t>12/11/22</a:t>
+              <a:t>17/11/22</a:t>
             </a:fld>
             <a:endParaRPr lang="it-IT"/>
           </a:p>
@@ -1140,7 +1140,7 @@
           <a:p>
             <a:fld id="{0C022E22-8E55-0642-8631-076F0F4D5404}" type="datetimeFigureOut">
               <a:rPr lang="it-IT" smtClean="0"/>
-              <a:t>12/11/22</a:t>
+              <a:t>17/11/22</a:t>
             </a:fld>
             <a:endParaRPr lang="it-IT"/>
           </a:p>
@@ -1405,7 +1405,7 @@
           <a:p>
             <a:fld id="{0C022E22-8E55-0642-8631-076F0F4D5404}" type="datetimeFigureOut">
               <a:rPr lang="it-IT" smtClean="0"/>
-              <a:t>12/11/22</a:t>
+              <a:t>17/11/22</a:t>
             </a:fld>
             <a:endParaRPr lang="it-IT"/>
           </a:p>
@@ -1817,7 +1817,7 @@
           <a:p>
             <a:fld id="{0C022E22-8E55-0642-8631-076F0F4D5404}" type="datetimeFigureOut">
               <a:rPr lang="it-IT" smtClean="0"/>
-              <a:t>12/11/22</a:t>
+              <a:t>17/11/22</a:t>
             </a:fld>
             <a:endParaRPr lang="it-IT"/>
           </a:p>
@@ -1958,7 +1958,7 @@
           <a:p>
             <a:fld id="{0C022E22-8E55-0642-8631-076F0F4D5404}" type="datetimeFigureOut">
               <a:rPr lang="it-IT" smtClean="0"/>
-              <a:t>12/11/22</a:t>
+              <a:t>17/11/22</a:t>
             </a:fld>
             <a:endParaRPr lang="it-IT"/>
           </a:p>
@@ -2071,7 +2071,7 @@
           <a:p>
             <a:fld id="{0C022E22-8E55-0642-8631-076F0F4D5404}" type="datetimeFigureOut">
               <a:rPr lang="it-IT" smtClean="0"/>
-              <a:t>12/11/22</a:t>
+              <a:t>17/11/22</a:t>
             </a:fld>
             <a:endParaRPr lang="it-IT"/>
           </a:p>
@@ -2382,7 +2382,7 @@
           <a:p>
             <a:fld id="{0C022E22-8E55-0642-8631-076F0F4D5404}" type="datetimeFigureOut">
               <a:rPr lang="it-IT" smtClean="0"/>
-              <a:t>12/11/22</a:t>
+              <a:t>17/11/22</a:t>
             </a:fld>
             <a:endParaRPr lang="it-IT"/>
           </a:p>
@@ -2670,7 +2670,7 @@
           <a:p>
             <a:fld id="{0C022E22-8E55-0642-8631-076F0F4D5404}" type="datetimeFigureOut">
               <a:rPr lang="it-IT" smtClean="0"/>
-              <a:t>12/11/22</a:t>
+              <a:t>17/11/22</a:t>
             </a:fld>
             <a:endParaRPr lang="it-IT"/>
           </a:p>
@@ -2911,7 +2911,7 @@
           <a:p>
             <a:fld id="{0C022E22-8E55-0642-8631-076F0F4D5404}" type="datetimeFigureOut">
               <a:rPr lang="it-IT" smtClean="0"/>
-              <a:t>12/11/22</a:t>
+              <a:t>17/11/22</a:t>
             </a:fld>
             <a:endParaRPr lang="it-IT"/>
           </a:p>
@@ -8210,7 +8210,7 @@
           </p:nvSpPr>
           <p:spPr>
             <a:xfrm>
-              <a:off x="2602675" y="2676033"/>
+              <a:off x="2602675" y="2700334"/>
               <a:ext cx="1615044" cy="523220"/>
             </a:xfrm>
             <a:prstGeom prst="rect">
@@ -8577,7 +8577,7 @@
           </p:nvSpPr>
           <p:spPr>
             <a:xfrm>
-              <a:off x="2602675" y="2587723"/>
+              <a:off x="2602675" y="2620126"/>
               <a:ext cx="1615044" cy="738664"/>
             </a:xfrm>
             <a:prstGeom prst="rect">
@@ -8663,44 +8663,8 @@
         </p:blipFill>
         <p:spPr>
           <a:xfrm>
-            <a:off x="7379675" y="1682270"/>
-            <a:ext cx="853516" cy="853516"/>
-          </a:xfrm>
-          <a:prstGeom prst="rect">
-            <a:avLst/>
-          </a:prstGeom>
-        </p:spPr>
-      </p:pic>
-      <p:pic>
-        <p:nvPicPr>
-          <p:cNvPr id="67" name="Elemento grafico 66" descr="Database con riempimento a tinta unita">
-            <a:extLst>
-              <a:ext uri="{FF2B5EF4-FFF2-40B4-BE49-F238E27FC236}">
-                <a16:creationId xmlns:a16="http://schemas.microsoft.com/office/drawing/2014/main" id="{43425A5E-C2D6-AEA0-2935-F831F160292A}"/>
-              </a:ext>
-            </a:extLst>
-          </p:cNvPr>
-          <p:cNvPicPr>
-            <a:picLocks noChangeAspect="1"/>
-          </p:cNvPicPr>
-          <p:nvPr/>
-        </p:nvPicPr>
-        <p:blipFill>
-          <a:blip r:embed="rId2">
-            <a:extLst>
-              <a:ext uri="{96DAC541-7B7A-43D3-8B79-37D633B846F1}">
-                <asvg:svgBlip xmlns:asvg="http://schemas.microsoft.com/office/drawing/2016/SVG/main" r:embed="rId3"/>
-              </a:ext>
-            </a:extLst>
-          </a:blip>
-          <a:stretch>
-            <a:fillRect/>
-          </a:stretch>
-        </p:blipFill>
-        <p:spPr>
-          <a:xfrm>
-            <a:off x="7374991" y="4912235"/>
-            <a:ext cx="853516" cy="853516"/>
+            <a:off x="7416278" y="1720002"/>
+            <a:ext cx="770126" cy="770126"/>
           </a:xfrm>
           <a:prstGeom prst="rect">
             <a:avLst/>
@@ -8902,7 +8866,7 @@
         </p:blipFill>
         <p:spPr>
           <a:xfrm>
-            <a:off x="80569" y="2728428"/>
+            <a:off x="80569" y="2632630"/>
             <a:ext cx="914400" cy="914400"/>
           </a:xfrm>
           <a:prstGeom prst="rect">
@@ -8963,7 +8927,7 @@
         </p:nvSpPr>
         <p:spPr>
           <a:xfrm>
-            <a:off x="47795" y="3635316"/>
+            <a:off x="47795" y="3565645"/>
             <a:ext cx="979948" cy="276999"/>
           </a:xfrm>
           <a:prstGeom prst="rect">
@@ -9048,8 +9012,8 @@
         </p:nvCxnSpPr>
         <p:spPr>
           <a:xfrm flipH="1" flipV="1">
-            <a:off x="994969" y="3185628"/>
-            <a:ext cx="2972499" cy="13087"/>
+            <a:off x="994969" y="3089830"/>
+            <a:ext cx="2972499" cy="0"/>
           </a:xfrm>
           <a:prstGeom prst="straightConnector1">
             <a:avLst/>
@@ -9128,15 +9092,14 @@
           </p:cNvPr>
           <p:cNvCxnSpPr>
             <a:cxnSpLocks/>
-            <a:stCxn id="47" idx="0"/>
-            <a:endCxn id="6" idx="3"/>
+            <a:endCxn id="6" idx="4"/>
           </p:cNvCxnSpPr>
           <p:nvPr/>
         </p:nvCxnSpPr>
         <p:spPr>
-          <a:xfrm flipH="1">
-            <a:off x="7134423" y="2277859"/>
-            <a:ext cx="2" cy="1783514"/>
+          <a:xfrm>
+            <a:off x="6924381" y="2388501"/>
+            <a:ext cx="882792" cy="2009248"/>
           </a:xfrm>
           <a:prstGeom prst="line">
             <a:avLst/>
@@ -9179,8 +9142,8 @@
         </p:nvSpPr>
         <p:spPr>
           <a:xfrm>
-            <a:off x="4279266" y="614991"/>
-            <a:ext cx="5897980" cy="5240543"/>
+            <a:off x="4279266" y="670510"/>
+            <a:ext cx="5897980" cy="5103869"/>
           </a:xfrm>
           <a:prstGeom prst="roundRect">
             <a:avLst>
@@ -9579,8 +9542,8 @@
         </p:nvSpPr>
         <p:spPr>
           <a:xfrm>
-            <a:off x="5896425" y="1265169"/>
-            <a:ext cx="600551" cy="494817"/>
+            <a:off x="5788925" y="2041398"/>
+            <a:ext cx="1222873" cy="494817"/>
           </a:xfrm>
           <a:prstGeom prst="roundRect">
             <a:avLst/>
@@ -9619,7 +9582,7 @@
                 <a:ea typeface="CMU Bright Roman" panose="02000603000000000000" pitchFamily="2" charset="0"/>
                 <a:cs typeface="CMU Bright Roman" panose="02000603000000000000" pitchFamily="2" charset="0"/>
               </a:rPr>
-              <a:t>REST</a:t>
+              <a:t>RESTAURANT</a:t>
             </a:r>
           </a:p>
           <a:p>
@@ -9633,16 +9596,8 @@
                 <a:ea typeface="CMU Bright Roman" panose="02000603000000000000" pitchFamily="2" charset="0"/>
                 <a:cs typeface="CMU Bright Roman" panose="02000603000000000000" pitchFamily="2" charset="0"/>
               </a:rPr>
-              <a:t>API</a:t>
+              <a:t>REST API</a:t>
             </a:r>
-            <a:endParaRPr lang="it-IT" sz="1100" dirty="0">
-              <a:solidFill>
-                <a:srgbClr val="71AD47"/>
-              </a:solidFill>
-              <a:latin typeface="CMU Bright Roman" panose="02000603000000000000" pitchFamily="2" charset="0"/>
-              <a:ea typeface="CMU Bright Roman" panose="02000603000000000000" pitchFamily="2" charset="0"/>
-              <a:cs typeface="CMU Bright Roman" panose="02000603000000000000" pitchFamily="2" charset="0"/>
-            </a:endParaRPr>
           </a:p>
         </p:txBody>
       </p:sp>
@@ -9787,87 +9742,6 @@
           </p:txBody>
         </p:sp>
       </p:grpSp>
-      <p:sp>
-        <p:nvSpPr>
-          <p:cNvPr id="21" name="Rettangolo con angoli arrotondati 20">
-            <a:extLst>
-              <a:ext uri="{FF2B5EF4-FFF2-40B4-BE49-F238E27FC236}">
-                <a16:creationId xmlns:a16="http://schemas.microsoft.com/office/drawing/2014/main" id="{3930B50D-B12B-0E87-1689-15215E587951}"/>
-              </a:ext>
-            </a:extLst>
-          </p:cNvPr>
-          <p:cNvSpPr/>
-          <p:nvPr/>
-        </p:nvSpPr>
-        <p:spPr>
-          <a:xfrm>
-            <a:off x="5902331" y="4551965"/>
-            <a:ext cx="600551" cy="494817"/>
-          </a:xfrm>
-          <a:prstGeom prst="roundRect">
-            <a:avLst/>
-          </a:prstGeom>
-          <a:ln>
-            <a:solidFill>
-              <a:srgbClr val="71AD47"/>
-            </a:solidFill>
-          </a:ln>
-        </p:spPr>
-        <p:style>
-          <a:lnRef idx="2">
-            <a:schemeClr val="accent6"/>
-          </a:lnRef>
-          <a:fillRef idx="1">
-            <a:schemeClr val="lt1"/>
-          </a:fillRef>
-          <a:effectRef idx="0">
-            <a:schemeClr val="accent6"/>
-          </a:effectRef>
-          <a:fontRef idx="minor">
-            <a:schemeClr val="dk1"/>
-          </a:fontRef>
-        </p:style>
-        <p:txBody>
-          <a:bodyPr rtlCol="0" anchor="ctr"/>
-          <a:lstStyle/>
-          <a:p>
-            <a:pPr algn="ctr"/>
-            <a:r>
-              <a:rPr lang="it-IT" sz="1100" dirty="0">
-                <a:solidFill>
-                  <a:srgbClr val="71AD47"/>
-                </a:solidFill>
-                <a:latin typeface="CMU Bright Roman" panose="02000603000000000000" pitchFamily="2" charset="0"/>
-                <a:ea typeface="CMU Bright Roman" panose="02000603000000000000" pitchFamily="2" charset="0"/>
-                <a:cs typeface="CMU Bright Roman" panose="02000603000000000000" pitchFamily="2" charset="0"/>
-              </a:rPr>
-              <a:t>REST</a:t>
-            </a:r>
-          </a:p>
-          <a:p>
-            <a:pPr algn="ctr"/>
-            <a:r>
-              <a:rPr lang="it-IT" sz="1100" dirty="0">
-                <a:solidFill>
-                  <a:srgbClr val="71AD47"/>
-                </a:solidFill>
-                <a:latin typeface="CMU Bright Roman" panose="02000603000000000000" pitchFamily="2" charset="0"/>
-                <a:ea typeface="CMU Bright Roman" panose="02000603000000000000" pitchFamily="2" charset="0"/>
-                <a:cs typeface="CMU Bright Roman" panose="02000603000000000000" pitchFamily="2" charset="0"/>
-              </a:rPr>
-              <a:t>API</a:t>
-            </a:r>
-            <a:endParaRPr lang="it-IT" sz="1100" dirty="0">
-              <a:solidFill>
-                <a:srgbClr val="71AD47"/>
-              </a:solidFill>
-              <a:latin typeface="CMU Bright Roman" panose="02000603000000000000" pitchFamily="2" charset="0"/>
-              <a:ea typeface="CMU Bright Roman" panose="02000603000000000000" pitchFamily="2" charset="0"/>
-              <a:cs typeface="CMU Bright Roman" panose="02000603000000000000" pitchFamily="2" charset="0"/>
-            </a:endParaRPr>
-          </a:p>
-        </p:txBody>
-      </p:sp>
       <p:grpSp>
         <p:nvGrpSpPr>
           <p:cNvPr id="3" name="Gruppo 2">
@@ -10007,14 +9881,14 @@
           <p:cNvCxnSpPr>
             <a:cxnSpLocks/>
             <a:stCxn id="13" idx="0"/>
-            <a:endCxn id="21" idx="1"/>
+            <a:endCxn id="71" idx="1"/>
           </p:cNvCxnSpPr>
           <p:nvPr/>
         </p:nvCxnSpPr>
         <p:spPr>
           <a:xfrm>
-            <a:off x="5201413" y="3984525"/>
-            <a:ext cx="700918" cy="814849"/>
+            <a:off x="5088199" y="3888727"/>
+            <a:ext cx="705530" cy="129474"/>
           </a:xfrm>
           <a:prstGeom prst="line">
             <a:avLst/>
@@ -10054,14 +9928,13 @@
           <p:cNvCxnSpPr>
             <a:cxnSpLocks/>
             <a:stCxn id="13" idx="3"/>
-            <a:endCxn id="19" idx="1"/>
           </p:cNvCxnSpPr>
           <p:nvPr/>
         </p:nvCxnSpPr>
         <p:spPr>
           <a:xfrm flipV="1">
-            <a:off x="5201413" y="1512578"/>
-            <a:ext cx="695012" cy="995947"/>
+            <a:off x="5088199" y="2262680"/>
+            <a:ext cx="700726" cy="150047"/>
           </a:xfrm>
           <a:prstGeom prst="line">
             <a:avLst/>
@@ -10103,7 +9976,7 @@
         </p:nvGrpSpPr>
         <p:grpSpPr>
           <a:xfrm>
-            <a:off x="4283414" y="2508525"/>
+            <a:off x="4170200" y="2412727"/>
             <a:ext cx="1836000" cy="1476000"/>
             <a:chOff x="2602675" y="2251169"/>
             <a:chExt cx="1615044" cy="1372946"/>
@@ -10214,18 +10087,7 @@
                   <a:ea typeface="CMU Bright Roman" panose="02000603000000000000" pitchFamily="2" charset="0"/>
                   <a:cs typeface="CMU Bright Roman" panose="02000603000000000000" pitchFamily="2" charset="0"/>
                 </a:rPr>
-                <a:t>GATEWA</a:t>
-              </a:r>
-              <a:r>
-                <a:rPr lang="it-IT" sz="1400" dirty="0">
-                  <a:solidFill>
-                    <a:srgbClr val="0070C0"/>
-                  </a:solidFill>
-                  <a:latin typeface="CMU Bright Roman" panose="02000603000000000000" pitchFamily="2" charset="0"/>
-                  <a:ea typeface="CMU Bright Roman" panose="02000603000000000000" pitchFamily="2" charset="0"/>
-                  <a:cs typeface="CMU Bright Roman" panose="02000603000000000000" pitchFamily="2" charset="0"/>
-                </a:rPr>
-                <a:t>Y</a:t>
+                <a:t>GATEWAY</a:t>
               </a:r>
             </a:p>
           </p:txBody>
@@ -10245,7 +10107,7 @@
         </p:nvSpPr>
         <p:spPr>
           <a:xfrm>
-            <a:off x="3970557" y="2964908"/>
+            <a:off x="3857343" y="2869110"/>
             <a:ext cx="600551" cy="494817"/>
           </a:xfrm>
           <a:prstGeom prst="roundRect">
@@ -10301,23 +10163,110 @@
               </a:rPr>
               <a:t>API</a:t>
             </a:r>
-            <a:endParaRPr lang="it-IT" sz="1100" dirty="0">
-              <a:solidFill>
-                <a:srgbClr val="0070C0"/>
-              </a:solidFill>
-              <a:latin typeface="CMU Bright Roman" panose="02000603000000000000" pitchFamily="2" charset="0"/>
-              <a:ea typeface="CMU Bright Roman" panose="02000603000000000000" pitchFamily="2" charset="0"/>
-              <a:cs typeface="CMU Bright Roman" panose="02000603000000000000" pitchFamily="2" charset="0"/>
-            </a:endParaRPr>
           </a:p>
         </p:txBody>
       </p:sp>
+      <p:cxnSp>
+        <p:nvCxnSpPr>
+          <p:cNvPr id="41" name="Connettore 1 40">
+            <a:extLst>
+              <a:ext uri="{FF2B5EF4-FFF2-40B4-BE49-F238E27FC236}">
+                <a16:creationId xmlns:a16="http://schemas.microsoft.com/office/drawing/2014/main" id="{90F0885B-FBC0-D8AD-94DC-0FF9B2C882A6}"/>
+              </a:ext>
+            </a:extLst>
+          </p:cNvPr>
+          <p:cNvCxnSpPr>
+            <a:cxnSpLocks/>
+            <a:endCxn id="6" idx="4"/>
+          </p:cNvCxnSpPr>
+          <p:nvPr/>
+        </p:nvCxnSpPr>
+        <p:spPr>
+          <a:xfrm flipH="1">
+            <a:off x="7807173" y="2156276"/>
+            <a:ext cx="1083136" cy="2241473"/>
+          </a:xfrm>
+          <a:prstGeom prst="line">
+            <a:avLst/>
+          </a:prstGeom>
+          <a:ln w="12700">
+            <a:solidFill>
+              <a:schemeClr val="accent6"/>
+            </a:solidFill>
+            <a:prstDash val="solid"/>
+            <a:headEnd type="none" w="med" len="med"/>
+            <a:tailEnd type="none" w="med" len="med"/>
+          </a:ln>
+        </p:spPr>
+        <p:style>
+          <a:lnRef idx="1">
+            <a:schemeClr val="accent1"/>
+          </a:lnRef>
+          <a:fillRef idx="0">
+            <a:schemeClr val="accent1"/>
+          </a:fillRef>
+          <a:effectRef idx="0">
+            <a:schemeClr val="accent1"/>
+          </a:effectRef>
+          <a:fontRef idx="minor">
+            <a:schemeClr val="tx1"/>
+          </a:fontRef>
+        </p:style>
+      </p:cxnSp>
+      <p:cxnSp>
+        <p:nvCxnSpPr>
+          <p:cNvPr id="54" name="Connettore 1 53">
+            <a:extLst>
+              <a:ext uri="{FF2B5EF4-FFF2-40B4-BE49-F238E27FC236}">
+                <a16:creationId xmlns:a16="http://schemas.microsoft.com/office/drawing/2014/main" id="{A20E7037-4257-06E7-1623-04BBB4EF1DF0}"/>
+              </a:ext>
+            </a:extLst>
+          </p:cNvPr>
+          <p:cNvCxnSpPr>
+            <a:cxnSpLocks/>
+            <a:stCxn id="76" idx="1"/>
+            <a:endCxn id="6" idx="4"/>
+          </p:cNvCxnSpPr>
+          <p:nvPr/>
+        </p:nvCxnSpPr>
+        <p:spPr>
+          <a:xfrm flipH="1">
+            <a:off x="7807173" y="4013437"/>
+            <a:ext cx="871119" cy="384312"/>
+          </a:xfrm>
+          <a:prstGeom prst="line">
+            <a:avLst/>
+          </a:prstGeom>
+          <a:ln w="12700">
+            <a:solidFill>
+              <a:schemeClr val="accent6"/>
+            </a:solidFill>
+            <a:prstDash val="solid"/>
+            <a:headEnd type="none" w="med" len="med"/>
+            <a:tailEnd type="none" w="med" len="med"/>
+          </a:ln>
+        </p:spPr>
+        <p:style>
+          <a:lnRef idx="1">
+            <a:schemeClr val="accent1"/>
+          </a:lnRef>
+          <a:fillRef idx="0">
+            <a:schemeClr val="accent1"/>
+          </a:fillRef>
+          <a:effectRef idx="0">
+            <a:schemeClr val="accent1"/>
+          </a:effectRef>
+          <a:fontRef idx="minor">
+            <a:schemeClr val="tx1"/>
+          </a:fontRef>
+        </p:style>
+      </p:cxnSp>
       <p:sp>
         <p:nvSpPr>
-          <p:cNvPr id="38" name="Rettangolo con angoli arrotondati 37">
-            <a:extLst>
-              <a:ext uri="{FF2B5EF4-FFF2-40B4-BE49-F238E27FC236}">
-                <a16:creationId xmlns:a16="http://schemas.microsoft.com/office/drawing/2014/main" id="{2F7E67DD-F837-0146-6299-A46FE7913DFC}"/>
+          <p:cNvPr id="64" name="Rettangolo con angoli arrotondati 63">
+            <a:extLst>
+              <a:ext uri="{FF2B5EF4-FFF2-40B4-BE49-F238E27FC236}">
+                <a16:creationId xmlns:a16="http://schemas.microsoft.com/office/drawing/2014/main" id="{273A280B-B953-3685-82CB-6959065CDBB5}"/>
               </a:ext>
             </a:extLst>
           </p:cNvPr>
@@ -10326,15 +10275,15 @@
         </p:nvSpPr>
         <p:spPr>
           <a:xfrm>
-            <a:off x="6834146" y="2060017"/>
-            <a:ext cx="600551" cy="494817"/>
+            <a:off x="1642183" y="4567484"/>
+            <a:ext cx="1013135" cy="494817"/>
           </a:xfrm>
           <a:prstGeom prst="roundRect">
             <a:avLst/>
           </a:prstGeom>
           <a:ln>
             <a:solidFill>
-              <a:srgbClr val="71AD47"/>
+              <a:schemeClr val="accent1"/>
             </a:solidFill>
           </a:ln>
         </p:spPr>
@@ -10360,13 +10309,13 @@
             <a:r>
               <a:rPr lang="it-IT" sz="1100" dirty="0">
                 <a:solidFill>
-                  <a:srgbClr val="71AD47"/>
+                  <a:srgbClr val="0070C0"/>
                 </a:solidFill>
                 <a:latin typeface="CMU Bright Roman" panose="02000603000000000000" pitchFamily="2" charset="0"/>
                 <a:ea typeface="CMU Bright Roman" panose="02000603000000000000" pitchFamily="2" charset="0"/>
                 <a:cs typeface="CMU Bright Roman" panose="02000603000000000000" pitchFamily="2" charset="0"/>
               </a:rPr>
-              <a:t>REST</a:t>
+              <a:t>WEB</a:t>
             </a:r>
           </a:p>
           <a:p>
@@ -10374,31 +10323,132 @@
             <a:r>
               <a:rPr lang="it-IT" sz="1100" dirty="0">
                 <a:solidFill>
-                  <a:srgbClr val="71AD47"/>
+                  <a:srgbClr val="0070C0"/>
                 </a:solidFill>
                 <a:latin typeface="CMU Bright Roman" panose="02000603000000000000" pitchFamily="2" charset="0"/>
                 <a:ea typeface="CMU Bright Roman" panose="02000603000000000000" pitchFamily="2" charset="0"/>
                 <a:cs typeface="CMU Bright Roman" panose="02000603000000000000" pitchFamily="2" charset="0"/>
               </a:rPr>
-              <a:t>API</a:t>
+              <a:t>INTERFACE</a:t>
             </a:r>
-            <a:endParaRPr lang="it-IT" sz="1100" dirty="0">
-              <a:solidFill>
-                <a:srgbClr val="71AD47"/>
-              </a:solidFill>
-              <a:latin typeface="CMU Bright Roman" panose="02000603000000000000" pitchFamily="2" charset="0"/>
-              <a:ea typeface="CMU Bright Roman" panose="02000603000000000000" pitchFamily="2" charset="0"/>
-              <a:cs typeface="CMU Bright Roman" panose="02000603000000000000" pitchFamily="2" charset="0"/>
-            </a:endParaRPr>
           </a:p>
         </p:txBody>
       </p:sp>
+      <p:pic>
+        <p:nvPicPr>
+          <p:cNvPr id="1026" name="Picture 2">
+            <a:extLst>
+              <a:ext uri="{FF2B5EF4-FFF2-40B4-BE49-F238E27FC236}">
+                <a16:creationId xmlns:a16="http://schemas.microsoft.com/office/drawing/2014/main" id="{C9F89DB4-0969-BF75-366A-5A6B4C82EF79}"/>
+              </a:ext>
+            </a:extLst>
+          </p:cNvPr>
+          <p:cNvPicPr>
+            <a:picLocks noChangeAspect="1" noChangeArrowheads="1"/>
+          </p:cNvPicPr>
+          <p:nvPr/>
+        </p:nvPicPr>
+        <p:blipFill>
+          <a:blip r:embed="rId8">
+            <a:alphaModFix/>
+            <a:duotone>
+              <a:schemeClr val="accent6">
+                <a:shade val="45000"/>
+                <a:satMod val="135000"/>
+              </a:schemeClr>
+              <a:prstClr val="white"/>
+            </a:duotone>
+            <a:extLst>
+              <a:ext uri="{BEBA8EAE-BF5A-486C-A8C5-ECC9F3942E4B}">
+                <a14:imgProps xmlns:a14="http://schemas.microsoft.com/office/drawing/2010/main">
+                  <a14:imgLayer r:embed="rId9">
+                    <a14:imgEffect>
+                      <a14:sharpenSoften amount="100000"/>
+                    </a14:imgEffect>
+                    <a14:imgEffect>
+                      <a14:colorTemperature colorTemp="11500"/>
+                    </a14:imgEffect>
+                    <a14:imgEffect>
+                      <a14:saturation sat="400000"/>
+                    </a14:imgEffect>
+                    <a14:imgEffect>
+                      <a14:brightnessContrast bright="-53000" contrast="-23000"/>
+                    </a14:imgEffect>
+                  </a14:imgLayer>
+                </a14:imgProps>
+              </a:ext>
+              <a:ext uri="{28A0092B-C50C-407E-A947-70E740481C1C}">
+                <a14:useLocalDpi xmlns:a14="http://schemas.microsoft.com/office/drawing/2010/main" val="0"/>
+              </a:ext>
+            </a:extLst>
+          </a:blip>
+          <a:srcRect/>
+          <a:stretch>
+            <a:fillRect/>
+          </a:stretch>
+        </p:blipFill>
+        <p:spPr bwMode="auto">
+          <a:xfrm>
+            <a:off x="10678250" y="4639084"/>
+            <a:ext cx="1013135" cy="1013135"/>
+          </a:xfrm>
+          <a:prstGeom prst="rect">
+            <a:avLst/>
+          </a:prstGeom>
+          <a:noFill/>
+          <a:extLst>
+            <a:ext uri="{909E8E84-426E-40DD-AFC4-6F175D3DCCD1}">
+              <a14:hiddenFill xmlns:a14="http://schemas.microsoft.com/office/drawing/2010/main">
+                <a:solidFill>
+                  <a:srgbClr val="FFFFFF"/>
+                </a:solidFill>
+              </a14:hiddenFill>
+            </a:ext>
+          </a:extLst>
+        </p:spPr>
+      </p:pic>
+      <p:pic>
+        <p:nvPicPr>
+          <p:cNvPr id="53" name="Elemento grafico 52" descr="Database con riempimento a tinta unita">
+            <a:extLst>
+              <a:ext uri="{FF2B5EF4-FFF2-40B4-BE49-F238E27FC236}">
+                <a16:creationId xmlns:a16="http://schemas.microsoft.com/office/drawing/2014/main" id="{29139A2E-5D51-0D6A-0009-D5E34A7AFB03}"/>
+              </a:ext>
+            </a:extLst>
+          </p:cNvPr>
+          <p:cNvPicPr>
+            <a:picLocks noChangeAspect="1"/>
+          </p:cNvPicPr>
+          <p:nvPr/>
+        </p:nvPicPr>
+        <p:blipFill>
+          <a:blip r:embed="rId2">
+            <a:extLst>
+              <a:ext uri="{96DAC541-7B7A-43D3-8B79-37D633B846F1}">
+                <asvg:svgBlip xmlns:asvg="http://schemas.microsoft.com/office/drawing/2016/SVG/main" r:embed="rId3"/>
+              </a:ext>
+            </a:extLst>
+          </a:blip>
+          <a:stretch>
+            <a:fillRect/>
+          </a:stretch>
+        </p:blipFill>
+        <p:spPr>
+          <a:xfrm>
+            <a:off x="7416278" y="4976278"/>
+            <a:ext cx="770126" cy="770126"/>
+          </a:xfrm>
+          <a:prstGeom prst="rect">
+            <a:avLst/>
+          </a:prstGeom>
+        </p:spPr>
+      </p:pic>
       <p:sp>
         <p:nvSpPr>
-          <p:cNvPr id="40" name="Rettangolo con angoli arrotondati 39">
-            <a:extLst>
-              <a:ext uri="{FF2B5EF4-FFF2-40B4-BE49-F238E27FC236}">
-                <a16:creationId xmlns:a16="http://schemas.microsoft.com/office/drawing/2014/main" id="{FAC61AAA-06A9-488E-18BF-69358285975A}"/>
+          <p:cNvPr id="71" name="Rettangolo con angoli arrotondati 70">
+            <a:extLst>
+              <a:ext uri="{FF2B5EF4-FFF2-40B4-BE49-F238E27FC236}">
+                <a16:creationId xmlns:a16="http://schemas.microsoft.com/office/drawing/2014/main" id="{216BE44A-B708-17CA-E932-1C5CD6B0B25A}"/>
               </a:ext>
             </a:extLst>
           </p:cNvPr>
@@ -10407,8 +10457,8 @@
         </p:nvSpPr>
         <p:spPr>
           <a:xfrm>
-            <a:off x="9004923" y="3814459"/>
-            <a:ext cx="600551" cy="494817"/>
+            <a:off x="5793729" y="3770793"/>
+            <a:ext cx="1222873" cy="494816"/>
           </a:xfrm>
           <a:prstGeom prst="roundRect">
             <a:avLst/>
@@ -10447,7 +10497,7 @@
                 <a:ea typeface="CMU Bright Roman" panose="02000603000000000000" pitchFamily="2" charset="0"/>
                 <a:cs typeface="CMU Bright Roman" panose="02000603000000000000" pitchFamily="2" charset="0"/>
               </a:rPr>
-              <a:t>REST</a:t>
+              <a:t>ORDERING</a:t>
             </a:r>
           </a:p>
           <a:p>
@@ -10461,72 +10511,17 @@
                 <a:ea typeface="CMU Bright Roman" panose="02000603000000000000" pitchFamily="2" charset="0"/>
                 <a:cs typeface="CMU Bright Roman" panose="02000603000000000000" pitchFamily="2" charset="0"/>
               </a:rPr>
-              <a:t>API</a:t>
+              <a:t>REST API</a:t>
             </a:r>
-            <a:endParaRPr lang="it-IT" sz="1100" dirty="0">
-              <a:solidFill>
-                <a:srgbClr val="71AD47"/>
-              </a:solidFill>
-              <a:latin typeface="CMU Bright Roman" panose="02000603000000000000" pitchFamily="2" charset="0"/>
-              <a:ea typeface="CMU Bright Roman" panose="02000603000000000000" pitchFamily="2" charset="0"/>
-              <a:cs typeface="CMU Bright Roman" panose="02000603000000000000" pitchFamily="2" charset="0"/>
-            </a:endParaRPr>
           </a:p>
         </p:txBody>
       </p:sp>
-      <p:cxnSp>
-        <p:nvCxnSpPr>
-          <p:cNvPr id="41" name="Connettore 1 40">
-            <a:extLst>
-              <a:ext uri="{FF2B5EF4-FFF2-40B4-BE49-F238E27FC236}">
-                <a16:creationId xmlns:a16="http://schemas.microsoft.com/office/drawing/2014/main" id="{90F0885B-FBC0-D8AD-94DC-0FF9B2C882A6}"/>
-              </a:ext>
-            </a:extLst>
-          </p:cNvPr>
-          <p:cNvCxnSpPr>
-            <a:cxnSpLocks/>
-            <a:endCxn id="6" idx="3"/>
-          </p:cNvCxnSpPr>
-          <p:nvPr/>
-        </p:nvCxnSpPr>
-        <p:spPr>
-          <a:xfrm flipH="1">
-            <a:off x="7134423" y="2420619"/>
-            <a:ext cx="2015331" cy="1640755"/>
-          </a:xfrm>
-          <a:prstGeom prst="line">
-            <a:avLst/>
-          </a:prstGeom>
-          <a:ln w="12700">
-            <a:solidFill>
-              <a:schemeClr val="accent6"/>
-            </a:solidFill>
-            <a:prstDash val="solid"/>
-            <a:headEnd type="none" w="med" len="med"/>
-            <a:tailEnd type="none" w="med" len="med"/>
-          </a:ln>
-        </p:spPr>
-        <p:style>
-          <a:lnRef idx="1">
-            <a:schemeClr val="accent1"/>
-          </a:lnRef>
-          <a:fillRef idx="0">
-            <a:schemeClr val="accent1"/>
-          </a:fillRef>
-          <a:effectRef idx="0">
-            <a:schemeClr val="accent1"/>
-          </a:effectRef>
-          <a:fontRef idx="minor">
-            <a:schemeClr val="tx1"/>
-          </a:fontRef>
-        </p:style>
-      </p:cxnSp>
       <p:sp>
         <p:nvSpPr>
-          <p:cNvPr id="39" name="Rettangolo con angoli arrotondati 38">
-            <a:extLst>
-              <a:ext uri="{FF2B5EF4-FFF2-40B4-BE49-F238E27FC236}">
-                <a16:creationId xmlns:a16="http://schemas.microsoft.com/office/drawing/2014/main" id="{E57F040E-6289-411A-FBCD-6E43E4262FA3}"/>
+          <p:cNvPr id="75" name="Rettangolo con angoli arrotondati 74">
+            <a:extLst>
+              <a:ext uri="{FF2B5EF4-FFF2-40B4-BE49-F238E27FC236}">
+                <a16:creationId xmlns:a16="http://schemas.microsoft.com/office/drawing/2014/main" id="{41A5983A-35B1-D971-F1B8-BBCD87C6FD61}"/>
               </a:ext>
             </a:extLst>
           </p:cNvPr>
@@ -10535,8 +10530,8 @@
         </p:nvSpPr>
         <p:spPr>
           <a:xfrm>
-            <a:off x="9002862" y="2058973"/>
-            <a:ext cx="600551" cy="494817"/>
+            <a:off x="8684130" y="2045634"/>
+            <a:ext cx="1222873" cy="494817"/>
           </a:xfrm>
           <a:prstGeom prst="roundRect">
             <a:avLst/>
@@ -10575,7 +10570,7 @@
                 <a:ea typeface="CMU Bright Roman" panose="02000603000000000000" pitchFamily="2" charset="0"/>
                 <a:cs typeface="CMU Bright Roman" panose="02000603000000000000" pitchFamily="2" charset="0"/>
               </a:rPr>
-              <a:t>REST</a:t>
+              <a:t>PAYMENT</a:t>
             </a:r>
           </a:p>
           <a:p>
@@ -10589,73 +10584,17 @@
                 <a:ea typeface="CMU Bright Roman" panose="02000603000000000000" pitchFamily="2" charset="0"/>
                 <a:cs typeface="CMU Bright Roman" panose="02000603000000000000" pitchFamily="2" charset="0"/>
               </a:rPr>
-              <a:t>API</a:t>
+              <a:t>REST API</a:t>
             </a:r>
-            <a:endParaRPr lang="it-IT" sz="1100" dirty="0">
-              <a:solidFill>
-                <a:srgbClr val="71AD47"/>
-              </a:solidFill>
-              <a:latin typeface="CMU Bright Roman" panose="02000603000000000000" pitchFamily="2" charset="0"/>
-              <a:ea typeface="CMU Bright Roman" panose="02000603000000000000" pitchFamily="2" charset="0"/>
-              <a:cs typeface="CMU Bright Roman" panose="02000603000000000000" pitchFamily="2" charset="0"/>
-            </a:endParaRPr>
           </a:p>
         </p:txBody>
       </p:sp>
-      <p:cxnSp>
-        <p:nvCxnSpPr>
-          <p:cNvPr id="54" name="Connettore 1 53">
-            <a:extLst>
-              <a:ext uri="{FF2B5EF4-FFF2-40B4-BE49-F238E27FC236}">
-                <a16:creationId xmlns:a16="http://schemas.microsoft.com/office/drawing/2014/main" id="{A20E7037-4257-06E7-1623-04BBB4EF1DF0}"/>
-              </a:ext>
-            </a:extLst>
-          </p:cNvPr>
-          <p:cNvCxnSpPr>
-            <a:cxnSpLocks/>
-            <a:stCxn id="40" idx="1"/>
-            <a:endCxn id="6" idx="3"/>
-          </p:cNvCxnSpPr>
-          <p:nvPr/>
-        </p:nvCxnSpPr>
-        <p:spPr>
-          <a:xfrm flipH="1" flipV="1">
-            <a:off x="7134423" y="4061374"/>
-            <a:ext cx="1870500" cy="494"/>
-          </a:xfrm>
-          <a:prstGeom prst="line">
-            <a:avLst/>
-          </a:prstGeom>
-          <a:ln w="12700">
-            <a:solidFill>
-              <a:schemeClr val="accent6"/>
-            </a:solidFill>
-            <a:prstDash val="solid"/>
-            <a:headEnd type="none" w="med" len="med"/>
-            <a:tailEnd type="none" w="med" len="med"/>
-          </a:ln>
-        </p:spPr>
-        <p:style>
-          <a:lnRef idx="1">
-            <a:schemeClr val="accent1"/>
-          </a:lnRef>
-          <a:fillRef idx="0">
-            <a:schemeClr val="accent1"/>
-          </a:fillRef>
-          <a:effectRef idx="0">
-            <a:schemeClr val="accent1"/>
-          </a:effectRef>
-          <a:fontRef idx="minor">
-            <a:schemeClr val="tx1"/>
-          </a:fontRef>
-        </p:style>
-      </p:cxnSp>
       <p:sp>
         <p:nvSpPr>
-          <p:cNvPr id="64" name="Rettangolo con angoli arrotondati 63">
-            <a:extLst>
-              <a:ext uri="{FF2B5EF4-FFF2-40B4-BE49-F238E27FC236}">
-                <a16:creationId xmlns:a16="http://schemas.microsoft.com/office/drawing/2014/main" id="{273A280B-B953-3685-82CB-6959065CDBB5}"/>
+          <p:cNvPr id="76" name="Rettangolo con angoli arrotondati 75">
+            <a:extLst>
+              <a:ext uri="{FF2B5EF4-FFF2-40B4-BE49-F238E27FC236}">
+                <a16:creationId xmlns:a16="http://schemas.microsoft.com/office/drawing/2014/main" id="{DD10E9DA-95EB-C20B-2852-DD130B8778DD}"/>
               </a:ext>
             </a:extLst>
           </p:cNvPr>
@@ -10664,15 +10603,15 @@
         </p:nvSpPr>
         <p:spPr>
           <a:xfrm>
-            <a:off x="1642183" y="4567484"/>
-            <a:ext cx="1013135" cy="494817"/>
+            <a:off x="8678292" y="3766028"/>
+            <a:ext cx="1222873" cy="494817"/>
           </a:xfrm>
           <a:prstGeom prst="roundRect">
             <a:avLst/>
           </a:prstGeom>
           <a:ln>
             <a:solidFill>
-              <a:schemeClr val="accent1"/>
+              <a:srgbClr val="71AD47"/>
             </a:solidFill>
           </a:ln>
         </p:spPr>
@@ -10698,13 +10637,13 @@
             <a:r>
               <a:rPr lang="it-IT" sz="1100" dirty="0">
                 <a:solidFill>
-                  <a:srgbClr val="0070C0"/>
+                  <a:srgbClr val="71AD47"/>
                 </a:solidFill>
                 <a:latin typeface="CMU Bright Roman" panose="02000603000000000000" pitchFamily="2" charset="0"/>
                 <a:ea typeface="CMU Bright Roman" panose="02000603000000000000" pitchFamily="2" charset="0"/>
                 <a:cs typeface="CMU Bright Roman" panose="02000603000000000000" pitchFamily="2" charset="0"/>
               </a:rPr>
-              <a:t>WEB</a:t>
+              <a:t>DELIVERY</a:t>
             </a:r>
           </a:p>
           <a:p>
@@ -10712,98 +10651,17 @@
             <a:r>
               <a:rPr lang="it-IT" sz="1100" dirty="0">
                 <a:solidFill>
-                  <a:srgbClr val="0070C0"/>
+                  <a:srgbClr val="71AD47"/>
                 </a:solidFill>
                 <a:latin typeface="CMU Bright Roman" panose="02000603000000000000" pitchFamily="2" charset="0"/>
                 <a:ea typeface="CMU Bright Roman" panose="02000603000000000000" pitchFamily="2" charset="0"/>
                 <a:cs typeface="CMU Bright Roman" panose="02000603000000000000" pitchFamily="2" charset="0"/>
               </a:rPr>
-              <a:t>INTERFACE</a:t>
+              <a:t>REST API</a:t>
             </a:r>
-            <a:endParaRPr lang="it-IT" sz="1100" dirty="0">
-              <a:solidFill>
-                <a:srgbClr val="0070C0"/>
-              </a:solidFill>
-              <a:latin typeface="CMU Bright Roman" panose="02000603000000000000" pitchFamily="2" charset="0"/>
-              <a:ea typeface="CMU Bright Roman" panose="02000603000000000000" pitchFamily="2" charset="0"/>
-              <a:cs typeface="CMU Bright Roman" panose="02000603000000000000" pitchFamily="2" charset="0"/>
-            </a:endParaRPr>
           </a:p>
         </p:txBody>
       </p:sp>
-      <p:pic>
-        <p:nvPicPr>
-          <p:cNvPr id="1026" name="Picture 2">
-            <a:extLst>
-              <a:ext uri="{FF2B5EF4-FFF2-40B4-BE49-F238E27FC236}">
-                <a16:creationId xmlns:a16="http://schemas.microsoft.com/office/drawing/2014/main" id="{C9F89DB4-0969-BF75-366A-5A6B4C82EF79}"/>
-              </a:ext>
-            </a:extLst>
-          </p:cNvPr>
-          <p:cNvPicPr>
-            <a:picLocks noChangeAspect="1" noChangeArrowheads="1"/>
-          </p:cNvPicPr>
-          <p:nvPr/>
-        </p:nvPicPr>
-        <p:blipFill>
-          <a:blip r:embed="rId8">
-            <a:alphaModFix/>
-            <a:duotone>
-              <a:schemeClr val="accent6">
-                <a:shade val="45000"/>
-                <a:satMod val="135000"/>
-              </a:schemeClr>
-              <a:prstClr val="white"/>
-            </a:duotone>
-            <a:extLst>
-              <a:ext uri="{BEBA8EAE-BF5A-486C-A8C5-ECC9F3942E4B}">
-                <a14:imgProps xmlns:a14="http://schemas.microsoft.com/office/drawing/2010/main">
-                  <a14:imgLayer r:embed="rId9">
-                    <a14:imgEffect>
-                      <a14:sharpenSoften amount="100000"/>
-                    </a14:imgEffect>
-                    <a14:imgEffect>
-                      <a14:colorTemperature colorTemp="11500"/>
-                    </a14:imgEffect>
-                    <a14:imgEffect>
-                      <a14:saturation sat="400000"/>
-                    </a14:imgEffect>
-                    <a14:imgEffect>
-                      <a14:brightnessContrast bright="-53000" contrast="-23000"/>
-                    </a14:imgEffect>
-                  </a14:imgLayer>
-                </a14:imgProps>
-              </a:ext>
-              <a:ext uri="{28A0092B-C50C-407E-A947-70E740481C1C}">
-                <a14:useLocalDpi xmlns:a14="http://schemas.microsoft.com/office/drawing/2010/main" val="0"/>
-              </a:ext>
-            </a:extLst>
-          </a:blip>
-          <a:srcRect/>
-          <a:stretch>
-            <a:fillRect/>
-          </a:stretch>
-        </p:blipFill>
-        <p:spPr bwMode="auto">
-          <a:xfrm>
-            <a:off x="10678250" y="4639084"/>
-            <a:ext cx="1013135" cy="1013135"/>
-          </a:xfrm>
-          <a:prstGeom prst="rect">
-            <a:avLst/>
-          </a:prstGeom>
-          <a:noFill/>
-          <a:extLst>
-            <a:ext uri="{909E8E84-426E-40DD-AFC4-6F175D3DCCD1}">
-              <a14:hiddenFill xmlns:a14="http://schemas.microsoft.com/office/drawing/2010/main">
-                <a:solidFill>
-                  <a:srgbClr val="FFFFFF"/>
-                </a:solidFill>
-              </a14:hiddenFill>
-            </a:ext>
-          </a:extLst>
-        </p:spPr>
-      </p:pic>
     </p:spTree>
     <p:extLst>
       <p:ext uri="{BB962C8B-B14F-4D97-AF65-F5344CB8AC3E}">

</xml_diff>